<commit_message>
Deploy to Kubernetes/AKS ready
https://elguerre.com/2021/11/05/dapr-en-azure-functions-2-n-deploy-a-kubernetes-aks/
</commit_message>
<xml_diff>
--- a/az-functions/hello-functions/assets/Dapr - azure-functions.pptx
+++ b/az-functions/hello-functions/assets/Dapr - azure-functions.pptx
@@ -6,7 +6,8 @@
   </p:sldMasterIdLst>
   <p:sldIdLst>
     <p:sldId id="256" r:id="rId2"/>
-    <p:sldId id="257" r:id="rId3"/>
+    <p:sldId id="258" r:id="rId3"/>
+    <p:sldId id="259" r:id="rId4"/>
   </p:sldIdLst>
   <p:sldSz cx="12192000" cy="6858000"/>
   <p:notesSz cx="6858000" cy="9144000"/>
@@ -262,7 +263,7 @@
           <a:p>
             <a:fld id="{36B00B66-830C-4223-A5A8-70D0C89DE14A}" type="datetimeFigureOut">
               <a:rPr lang="es-ES" smtClean="0"/>
-              <a:t>20/10/2021</a:t>
+              <a:t>05/11/2021</a:t>
             </a:fld>
             <a:endParaRPr lang="es-ES"/>
           </a:p>
@@ -462,7 +463,7 @@
           <a:p>
             <a:fld id="{36B00B66-830C-4223-A5A8-70D0C89DE14A}" type="datetimeFigureOut">
               <a:rPr lang="es-ES" smtClean="0"/>
-              <a:t>20/10/2021</a:t>
+              <a:t>05/11/2021</a:t>
             </a:fld>
             <a:endParaRPr lang="es-ES"/>
           </a:p>
@@ -672,7 +673,7 @@
           <a:p>
             <a:fld id="{36B00B66-830C-4223-A5A8-70D0C89DE14A}" type="datetimeFigureOut">
               <a:rPr lang="es-ES" smtClean="0"/>
-              <a:t>20/10/2021</a:t>
+              <a:t>05/11/2021</a:t>
             </a:fld>
             <a:endParaRPr lang="es-ES"/>
           </a:p>
@@ -872,7 +873,7 @@
           <a:p>
             <a:fld id="{36B00B66-830C-4223-A5A8-70D0C89DE14A}" type="datetimeFigureOut">
               <a:rPr lang="es-ES" smtClean="0"/>
-              <a:t>20/10/2021</a:t>
+              <a:t>05/11/2021</a:t>
             </a:fld>
             <a:endParaRPr lang="es-ES"/>
           </a:p>
@@ -1148,7 +1149,7 @@
           <a:p>
             <a:fld id="{36B00B66-830C-4223-A5A8-70D0C89DE14A}" type="datetimeFigureOut">
               <a:rPr lang="es-ES" smtClean="0"/>
-              <a:t>20/10/2021</a:t>
+              <a:t>05/11/2021</a:t>
             </a:fld>
             <a:endParaRPr lang="es-ES"/>
           </a:p>
@@ -1416,7 +1417,7 @@
           <a:p>
             <a:fld id="{36B00B66-830C-4223-A5A8-70D0C89DE14A}" type="datetimeFigureOut">
               <a:rPr lang="es-ES" smtClean="0"/>
-              <a:t>20/10/2021</a:t>
+              <a:t>05/11/2021</a:t>
             </a:fld>
             <a:endParaRPr lang="es-ES"/>
           </a:p>
@@ -1831,7 +1832,7 @@
           <a:p>
             <a:fld id="{36B00B66-830C-4223-A5A8-70D0C89DE14A}" type="datetimeFigureOut">
               <a:rPr lang="es-ES" smtClean="0"/>
-              <a:t>20/10/2021</a:t>
+              <a:t>05/11/2021</a:t>
             </a:fld>
             <a:endParaRPr lang="es-ES"/>
           </a:p>
@@ -1973,7 +1974,7 @@
           <a:p>
             <a:fld id="{36B00B66-830C-4223-A5A8-70D0C89DE14A}" type="datetimeFigureOut">
               <a:rPr lang="es-ES" smtClean="0"/>
-              <a:t>20/10/2021</a:t>
+              <a:t>05/11/2021</a:t>
             </a:fld>
             <a:endParaRPr lang="es-ES"/>
           </a:p>
@@ -2086,7 +2087,7 @@
           <a:p>
             <a:fld id="{36B00B66-830C-4223-A5A8-70D0C89DE14A}" type="datetimeFigureOut">
               <a:rPr lang="es-ES" smtClean="0"/>
-              <a:t>20/10/2021</a:t>
+              <a:t>05/11/2021</a:t>
             </a:fld>
             <a:endParaRPr lang="es-ES"/>
           </a:p>
@@ -2399,7 +2400,7 @@
           <a:p>
             <a:fld id="{36B00B66-830C-4223-A5A8-70D0C89DE14A}" type="datetimeFigureOut">
               <a:rPr lang="es-ES" smtClean="0"/>
-              <a:t>20/10/2021</a:t>
+              <a:t>05/11/2021</a:t>
             </a:fld>
             <a:endParaRPr lang="es-ES"/>
           </a:p>
@@ -2688,7 +2689,7 @@
           <a:p>
             <a:fld id="{36B00B66-830C-4223-A5A8-70D0C89DE14A}" type="datetimeFigureOut">
               <a:rPr lang="es-ES" smtClean="0"/>
-              <a:t>20/10/2021</a:t>
+              <a:t>05/11/2021</a:t>
             </a:fld>
             <a:endParaRPr lang="es-ES"/>
           </a:p>
@@ -2931,7 +2932,7 @@
           <a:p>
             <a:fld id="{36B00B66-830C-4223-A5A8-70D0C89DE14A}" type="datetimeFigureOut">
               <a:rPr lang="es-ES" smtClean="0"/>
-              <a:t>20/10/2021</a:t>
+              <a:t>05/11/2021</a:t>
             </a:fld>
             <a:endParaRPr lang="es-ES"/>
           </a:p>
@@ -3376,7 +3377,7 @@
         </p:blipFill>
         <p:spPr>
           <a:xfrm>
-            <a:off x="4558211" y="1179512"/>
+            <a:off x="4691854" y="1179512"/>
             <a:ext cx="4962525" cy="4486275"/>
           </a:xfrm>
           <a:prstGeom prst="rect">
@@ -3557,14 +3558,6 @@
 <file path=ppt/slides/slide2.xml><?xml version="1.0" encoding="utf-8"?>
 <p:sld xmlns:a="http://schemas.openxmlformats.org/drawingml/2006/main" xmlns:r="http://schemas.openxmlformats.org/officeDocument/2006/relationships" xmlns:p="http://schemas.openxmlformats.org/presentationml/2006/main">
   <p:cSld>
-    <p:bg>
-      <p:bgPr>
-        <a:solidFill>
-          <a:schemeClr val="bg1"/>
-        </a:solidFill>
-        <a:effectLst/>
-      </p:bgPr>
-    </p:bg>
     <p:spTree>
       <p:nvGrpSpPr>
         <p:cNvPr id="1" name=""/>
@@ -3581,10 +3574,289 @@
       </p:grpSpPr>
       <p:pic>
         <p:nvPicPr>
-          <p:cNvPr id="3" name="Picture 2">
-            <a:extLst>
-              <a:ext uri="{FF2B5EF4-FFF2-40B4-BE49-F238E27FC236}">
-                <a16:creationId xmlns:a16="http://schemas.microsoft.com/office/drawing/2014/main" id="{7E5C76C3-107D-4BA5-941D-1C1DBBB03141}"/>
+          <p:cNvPr id="8" name="Picture 7" descr="Diagram&#10;&#10;Description automatically generated">
+            <a:extLst>
+              <a:ext uri="{FF2B5EF4-FFF2-40B4-BE49-F238E27FC236}">
+                <a16:creationId xmlns:a16="http://schemas.microsoft.com/office/drawing/2014/main" id="{79151608-B68A-4F0B-AE7D-FCDB9D714E38}"/>
+              </a:ext>
+            </a:extLst>
+          </p:cNvPr>
+          <p:cNvPicPr>
+            <a:picLocks noChangeAspect="1"/>
+          </p:cNvPicPr>
+          <p:nvPr/>
+        </p:nvPicPr>
+        <p:blipFill>
+          <a:blip r:embed="rId2">
+            <a:extLst>
+              <a:ext uri="{28A0092B-C50C-407E-A947-70E740481C1C}">
+                <a14:useLocalDpi xmlns:a14="http://schemas.microsoft.com/office/drawing/2010/main" val="0"/>
+              </a:ext>
+            </a:extLst>
+          </a:blip>
+          <a:stretch>
+            <a:fillRect/>
+          </a:stretch>
+        </p:blipFill>
+        <p:spPr>
+          <a:xfrm>
+            <a:off x="4723838" y="1185862"/>
+            <a:ext cx="4962525" cy="4486275"/>
+          </a:xfrm>
+          <a:prstGeom prst="rect">
+            <a:avLst/>
+          </a:prstGeom>
+        </p:spPr>
+      </p:pic>
+      <p:grpSp>
+        <p:nvGrpSpPr>
+          <p:cNvPr id="4" name="Group 3">
+            <a:extLst>
+              <a:ext uri="{FF2B5EF4-FFF2-40B4-BE49-F238E27FC236}">
+                <a16:creationId xmlns:a16="http://schemas.microsoft.com/office/drawing/2014/main" id="{0184847E-0E3E-4AF3-AD28-335703F20A67}"/>
+              </a:ext>
+            </a:extLst>
+          </p:cNvPr>
+          <p:cNvGrpSpPr/>
+          <p:nvPr/>
+        </p:nvGrpSpPr>
+        <p:grpSpPr>
+          <a:xfrm>
+            <a:off x="1630999" y="1311442"/>
+            <a:ext cx="3184389" cy="2962981"/>
+            <a:chOff x="5549705" y="684349"/>
+            <a:chExt cx="3608363" cy="3271237"/>
+          </a:xfrm>
+        </p:grpSpPr>
+        <p:pic>
+          <p:nvPicPr>
+            <p:cNvPr id="1028" name="Picture 4" descr="Precios - Functions | Microsoft Azure">
+              <a:extLst>
+                <a:ext uri="{FF2B5EF4-FFF2-40B4-BE49-F238E27FC236}">
+                  <a16:creationId xmlns:a16="http://schemas.microsoft.com/office/drawing/2014/main" id="{441A7B32-A787-4F58-9E97-11A024D38F55}"/>
+                </a:ext>
+              </a:extLst>
+            </p:cNvPr>
+            <p:cNvPicPr>
+              <a:picLocks noChangeAspect="1" noChangeArrowheads="1"/>
+            </p:cNvPicPr>
+            <p:nvPr/>
+          </p:nvPicPr>
+          <p:blipFill rotWithShape="1">
+            <a:blip r:embed="rId3">
+              <a:extLst>
+                <a:ext uri="{28A0092B-C50C-407E-A947-70E740481C1C}">
+                  <a14:useLocalDpi xmlns:a14="http://schemas.microsoft.com/office/drawing/2010/main" val="0"/>
+                </a:ext>
+              </a:extLst>
+            </a:blip>
+            <a:srcRect l="14668" r="12975"/>
+            <a:stretch/>
+          </p:blipFill>
+          <p:spPr bwMode="auto">
+            <a:xfrm>
+              <a:off x="5549705" y="684349"/>
+              <a:ext cx="3608363" cy="2618174"/>
+            </a:xfrm>
+            <a:prstGeom prst="rect">
+              <a:avLst/>
+            </a:prstGeom>
+            <a:noFill/>
+            <a:extLst>
+              <a:ext uri="{909E8E84-426E-40DD-AFC4-6F175D3DCCD1}">
+                <a14:hiddenFill xmlns:a14="http://schemas.microsoft.com/office/drawing/2010/main">
+                  <a:solidFill>
+                    <a:srgbClr val="FFFFFF"/>
+                  </a:solidFill>
+                </a14:hiddenFill>
+              </a:ext>
+            </a:extLst>
+          </p:spPr>
+        </p:pic>
+        <p:pic>
+          <p:nvPicPr>
+            <p:cNvPr id="1026" name="Picture 2" descr="NuGet Gallery | Dapr.AzureFunctions.Extension 0.10.0-preview01">
+              <a:extLst>
+                <a:ext uri="{FF2B5EF4-FFF2-40B4-BE49-F238E27FC236}">
+                  <a16:creationId xmlns:a16="http://schemas.microsoft.com/office/drawing/2014/main" id="{B2E0C292-9A2E-4E42-8805-E8EE5EC46954}"/>
+                </a:ext>
+              </a:extLst>
+            </p:cNvPr>
+            <p:cNvPicPr>
+              <a:picLocks noChangeAspect="1" noChangeArrowheads="1"/>
+            </p:cNvPicPr>
+            <p:nvPr/>
+          </p:nvPicPr>
+          <p:blipFill>
+            <a:blip r:embed="rId4">
+              <a:extLst>
+                <a:ext uri="{28A0092B-C50C-407E-A947-70E740481C1C}">
+                  <a14:useLocalDpi xmlns:a14="http://schemas.microsoft.com/office/drawing/2010/main" val="0"/>
+                </a:ext>
+              </a:extLst>
+            </a:blip>
+            <a:srcRect/>
+            <a:stretch>
+              <a:fillRect/>
+            </a:stretch>
+          </p:blipFill>
+          <p:spPr bwMode="auto">
+            <a:xfrm>
+              <a:off x="6999995" y="1993436"/>
+              <a:ext cx="1962150" cy="1962150"/>
+            </a:xfrm>
+            <a:prstGeom prst="rect">
+              <a:avLst/>
+            </a:prstGeom>
+            <a:noFill/>
+            <a:extLst>
+              <a:ext uri="{909E8E84-426E-40DD-AFC4-6F175D3DCCD1}">
+                <a14:hiddenFill xmlns:a14="http://schemas.microsoft.com/office/drawing/2010/main">
+                  <a:solidFill>
+                    <a:srgbClr val="FFFFFF"/>
+                  </a:solidFill>
+                </a14:hiddenFill>
+              </a:ext>
+            </a:extLst>
+          </p:spPr>
+        </p:pic>
+      </p:grpSp>
+      <p:sp>
+        <p:nvSpPr>
+          <p:cNvPr id="7" name="TextBox 6">
+            <a:extLst>
+              <a:ext uri="{FF2B5EF4-FFF2-40B4-BE49-F238E27FC236}">
+                <a16:creationId xmlns:a16="http://schemas.microsoft.com/office/drawing/2014/main" id="{C9A20C74-57FB-4179-81DC-72D5E1852DE5}"/>
+              </a:ext>
+            </a:extLst>
+          </p:cNvPr>
+          <p:cNvSpPr txBox="1"/>
+          <p:nvPr/>
+        </p:nvSpPr>
+        <p:spPr>
+          <a:xfrm>
+            <a:off x="5596597" y="5307089"/>
+            <a:ext cx="3500638" cy="307777"/>
+          </a:xfrm>
+          <a:prstGeom prst="rect">
+            <a:avLst/>
+          </a:prstGeom>
+          <a:noFill/>
+        </p:spPr>
+        <p:txBody>
+          <a:bodyPr wrap="none" rtlCol="0">
+            <a:spAutoFit/>
+          </a:bodyPr>
+          <a:lstStyle/>
+          <a:p>
+            <a:r>
+              <a:rPr lang="es-ES_tradnl" sz="1400" i="1" dirty="0" err="1">
+                <a:solidFill>
+                  <a:srgbClr val="1566BF"/>
+                </a:solidFill>
+              </a:rPr>
+              <a:t>Architecture</a:t>
+            </a:r>
+            <a:r>
+              <a:rPr lang="es-ES_tradnl" sz="1400" i="1" dirty="0">
+                <a:solidFill>
+                  <a:srgbClr val="1566BF"/>
+                </a:solidFill>
+              </a:rPr>
+              <a:t> </a:t>
+            </a:r>
+            <a:r>
+              <a:rPr lang="es-ES_tradnl" sz="1400" i="1" dirty="0" err="1">
+                <a:solidFill>
+                  <a:srgbClr val="1566BF"/>
+                </a:solidFill>
+              </a:rPr>
+              <a:t>Sample</a:t>
+            </a:r>
+            <a:r>
+              <a:rPr lang="es-ES_tradnl" sz="1400" i="1" dirty="0">
+                <a:solidFill>
+                  <a:srgbClr val="1566BF"/>
+                </a:solidFill>
+              </a:rPr>
+              <a:t> (</a:t>
+            </a:r>
+            <a:r>
+              <a:rPr lang="es-ES_tradnl" sz="1400" i="1" dirty="0" err="1">
+                <a:solidFill>
+                  <a:srgbClr val="1566BF"/>
+                </a:solidFill>
+              </a:rPr>
+              <a:t>Kubernetes</a:t>
+            </a:r>
+            <a:r>
+              <a:rPr lang="es-ES_tradnl" sz="1400" i="1" dirty="0">
+                <a:solidFill>
+                  <a:srgbClr val="1566BF"/>
+                </a:solidFill>
+              </a:rPr>
+              <a:t>/AKS </a:t>
+            </a:r>
+            <a:r>
+              <a:rPr lang="es-ES_tradnl" sz="1400" i="1" dirty="0" err="1">
+                <a:solidFill>
+                  <a:srgbClr val="1566BF"/>
+                </a:solidFill>
+              </a:rPr>
+              <a:t>Deploy</a:t>
+            </a:r>
+            <a:r>
+              <a:rPr lang="es-ES_tradnl" sz="1400" i="1" dirty="0">
+                <a:solidFill>
+                  <a:srgbClr val="1566BF"/>
+                </a:solidFill>
+              </a:rPr>
+              <a:t>)</a:t>
+            </a:r>
+            <a:endParaRPr lang="es-ES" sz="1400" i="1" dirty="0">
+              <a:solidFill>
+                <a:srgbClr val="1566BF"/>
+              </a:solidFill>
+            </a:endParaRPr>
+          </a:p>
+        </p:txBody>
+      </p:sp>
+    </p:spTree>
+    <p:extLst>
+      <p:ext uri="{BB962C8B-B14F-4D97-AF65-F5344CB8AC3E}">
+        <p14:creationId xmlns:p14="http://schemas.microsoft.com/office/powerpoint/2010/main" val="2970305459"/>
+      </p:ext>
+    </p:extLst>
+  </p:cSld>
+  <p:clrMapOvr>
+    <a:masterClrMapping/>
+  </p:clrMapOvr>
+</p:sld>
+</file>
+
+<file path=ppt/slides/slide3.xml><?xml version="1.0" encoding="utf-8"?>
+<p:sld xmlns:a="http://schemas.openxmlformats.org/drawingml/2006/main" xmlns:r="http://schemas.openxmlformats.org/officeDocument/2006/relationships" xmlns:p="http://schemas.openxmlformats.org/presentationml/2006/main">
+  <p:cSld>
+    <p:spTree>
+      <p:nvGrpSpPr>
+        <p:cNvPr id="1" name=""/>
+        <p:cNvGrpSpPr/>
+        <p:nvPr/>
+      </p:nvGrpSpPr>
+      <p:grpSpPr>
+        <a:xfrm>
+          <a:off x="0" y="0"/>
+          <a:ext cx="0" cy="0"/>
+          <a:chOff x="0" y="0"/>
+          <a:chExt cx="0" cy="0"/>
+        </a:xfrm>
+      </p:grpSpPr>
+      <p:pic>
+        <p:nvPicPr>
+          <p:cNvPr id="11" name="Picture 10">
+            <a:extLst>
+              <a:ext uri="{FF2B5EF4-FFF2-40B4-BE49-F238E27FC236}">
+                <a16:creationId xmlns:a16="http://schemas.microsoft.com/office/drawing/2014/main" id="{BB4B6A3E-F6B4-4C8B-9626-79A5AD785C53}"/>
               </a:ext>
             </a:extLst>
           </p:cNvPr>
@@ -3601,8 +3873,8 @@
         </p:blipFill>
         <p:spPr>
           <a:xfrm>
-            <a:off x="2151546" y="1154995"/>
-            <a:ext cx="7888908" cy="4548010"/>
+            <a:off x="2069243" y="1185477"/>
+            <a:ext cx="8053514" cy="4487045"/>
           </a:xfrm>
           <a:prstGeom prst="rect">
             <a:avLst/>
@@ -3612,7 +3884,7 @@
     </p:spTree>
     <p:extLst>
       <p:ext uri="{BB962C8B-B14F-4D97-AF65-F5344CB8AC3E}">
-        <p14:creationId xmlns:p14="http://schemas.microsoft.com/office/powerpoint/2010/main" val="185168374"/>
+        <p14:creationId xmlns:p14="http://schemas.microsoft.com/office/powerpoint/2010/main" val="2417771648"/>
       </p:ext>
     </p:extLst>
   </p:cSld>

</xml_diff>